<commit_message>
Updated last two slides.
</commit_message>
<xml_diff>
--- a/Presentations for Visual Studio Code MVA/05.Debugging-and-deploying-nodejs.pptx
+++ b/Presentations for Visual Studio Code MVA/05.Debugging-and-deploying-nodejs.pptx
@@ -216,7 +216,7 @@
           <a:p>
             <a:fld id="{312E7B4A-039C-48A2-9B2C-AF16AA3873D8}" type="datetimeFigureOut">
               <a:rPr lang="en-US" smtClean="0"/>
-              <a:t>7/27/2015</a:t>
+              <a:t>7/28/2015</a:t>
             </a:fld>
             <a:endParaRPr lang="en-US"/>
           </a:p>
@@ -381,7 +381,7 @@
           <a:p>
             <a:fld id="{DA005A0C-54D9-45AA-87D4-C551D08DFCE1}" type="datetimeFigureOut">
               <a:rPr lang="en-US" smtClean="0"/>
-              <a:t>7/27/2015</a:t>
+              <a:t>7/28/2015</a:t>
             </a:fld>
             <a:endParaRPr lang="en-US"/>
           </a:p>
@@ -3948,11 +3948,7 @@
             <a:pPr marL="914400" indent="-914400"/>
             <a:r>
               <a:rPr lang="en-US" dirty="0" smtClean="0"/>
-              <a:t>05 </a:t>
-            </a:r>
-            <a:r>
-              <a:rPr lang="en-US" dirty="0" smtClean="0"/>
-              <a:t>| Debugging and Deploying on Azure</a:t>
+              <a:t>05 | Debugging and Deploying on Azure</a:t>
             </a:r>
             <a:endParaRPr lang="en-US" dirty="0"/>
           </a:p>
@@ -4062,11 +4058,7 @@
             <a:pPr marL="914400" indent="-914400"/>
             <a:r>
               <a:rPr lang="en-US" dirty="0" smtClean="0"/>
-              <a:t>06 | Deploying to Azure with </a:t>
-            </a:r>
-            <a:r>
-              <a:rPr lang="en-US" dirty="0" smtClean="0"/>
-              <a:t>GitHub</a:t>
+              <a:t>06 | Deploying to Azure with GitHub</a:t>
             </a:r>
             <a:endParaRPr lang="en-US" dirty="0"/>
           </a:p>
@@ -4168,11 +4160,7 @@
           <a:p>
             <a:r>
               <a:rPr lang="en-US" dirty="0" smtClean="0"/>
-              <a:t>Deploying to Azure with </a:t>
-            </a:r>
-            <a:r>
-              <a:rPr lang="en-US" dirty="0" smtClean="0"/>
-              <a:t>GitHub</a:t>
+              <a:t>Deploying to Azure with GitHub</a:t>
             </a:r>
             <a:endParaRPr lang="en-US" dirty="0"/>
           </a:p>
@@ -4233,11 +4221,7 @@
             <a:pPr marL="914400" indent="-914400"/>
             <a:r>
               <a:rPr lang="en-US" dirty="0" smtClean="0"/>
-              <a:t>06 | </a:t>
-            </a:r>
-            <a:r>
-              <a:rPr lang="en-US" dirty="0" smtClean="0"/>
-              <a:t>Advanced Debugging</a:t>
+              <a:t>06 | Advanced Debugging</a:t>
             </a:r>
             <a:endParaRPr lang="en-US" dirty="0"/>
           </a:p>
@@ -4436,31 +4420,20 @@
           <a:p>
             <a:r>
               <a:rPr lang="en-GB" dirty="0" smtClean="0"/>
-              <a:t>Deploying to Azure with </a:t>
-            </a:r>
-            <a:r>
-              <a:rPr lang="en-GB" smtClean="0"/>
-              <a:t>the Command Line</a:t>
-            </a:r>
-            <a:endParaRPr lang="en-GB" dirty="0" smtClean="0"/>
+              <a:t>Deploying to Azure with the Command Line</a:t>
+            </a:r>
           </a:p>
           <a:p>
             <a:r>
               <a:rPr lang="en-GB" dirty="0" smtClean="0"/>
-              <a:t>Deploying to Azure with </a:t>
-            </a:r>
-            <a:r>
-              <a:rPr lang="en-GB" dirty="0" smtClean="0"/>
-              <a:t>GitHub</a:t>
-            </a:r>
-            <a:endParaRPr lang="en-GB" dirty="0" smtClean="0"/>
+              <a:t>Deploying to Azure with GitHub</a:t>
+            </a:r>
           </a:p>
           <a:p>
             <a:r>
               <a:rPr lang="en-GB" dirty="0" smtClean="0"/>
               <a:t>Advanced Debugging</a:t>
             </a:r>
-            <a:endParaRPr lang="en-GB" dirty="0" smtClean="0"/>
           </a:p>
         </p:txBody>
       </p:sp>
@@ -4552,12 +4525,12 @@
               <a:t>06 | Azure </a:t>
             </a:r>
             <a:r>
-              <a:rPr lang="en-US" dirty="0" err="1" smtClean="0"/>
-              <a:t>WebSites</a:t>
-            </a:r>
-            <a:r>
-              <a:rPr lang="en-US" dirty="0" smtClean="0"/>
-              <a:t> Overview</a:t>
+              <a:rPr lang="en-US" dirty="0" smtClean="0"/>
+              <a:t>Web Apps </a:t>
+            </a:r>
+            <a:r>
+              <a:rPr lang="en-US" dirty="0" smtClean="0"/>
+              <a:t>Overview</a:t>
             </a:r>
             <a:endParaRPr lang="en-US" dirty="0"/>
           </a:p>
@@ -4659,7 +4632,11 @@
           <a:p>
             <a:r>
               <a:rPr lang="en-US" dirty="0" smtClean="0"/>
-              <a:t>Azure Websites</a:t>
+              <a:t>Azure </a:t>
+            </a:r>
+            <a:r>
+              <a:rPr lang="en-US" dirty="0" smtClean="0"/>
+              <a:t>Web Apps</a:t>
             </a:r>
             <a:endParaRPr lang="en-US" dirty="0"/>
           </a:p>
@@ -4682,7 +4659,15 @@
           <a:p>
             <a:r>
               <a:rPr lang="en-US" dirty="0" smtClean="0"/>
-              <a:t>Easy to deploy a variety of different web sites : node, python, </a:t>
+              <a:t>Easy to deploy a variety of different web </a:t>
+            </a:r>
+            <a:r>
+              <a:rPr lang="en-US" dirty="0" smtClean="0"/>
+              <a:t>sites: </a:t>
+            </a:r>
+            <a:r>
+              <a:rPr lang="en-US" dirty="0" smtClean="0"/>
+              <a:t>node, python, </a:t>
             </a:r>
             <a:r>
               <a:rPr lang="en-US" dirty="0" err="1" smtClean="0"/>
@@ -4696,14 +4681,24 @@
           <a:p>
             <a:r>
               <a:rPr lang="en-US" dirty="0" smtClean="0"/>
-              <a:t>Can install some software from the gallery like WordPress or preconfigured stacks ( MEAN stack ) </a:t>
-            </a:r>
+              <a:t>Can install some software from the gallery like WordPress or preconfigured stacks </a:t>
+            </a:r>
+            <a:r>
+              <a:rPr lang="en-US" dirty="0" smtClean="0"/>
+              <a:t>(MEAN stack).</a:t>
+            </a:r>
+            <a:endParaRPr lang="en-US" dirty="0" smtClean="0"/>
           </a:p>
           <a:p>
             <a:r>
               <a:rPr lang="en-US" dirty="0" smtClean="0"/>
               <a:t>Has a few limitations such as cannot configure ports, compile native modules for Node </a:t>
             </a:r>
+            <a:r>
+              <a:rPr lang="en-US" dirty="0" smtClean="0"/>
+              <a:t>.</a:t>
+            </a:r>
+            <a:endParaRPr lang="en-US" dirty="0" smtClean="0"/>
           </a:p>
           <a:p>
             <a:endParaRPr lang="en-US" dirty="0"/>
@@ -4757,7 +4752,11 @@
           <a:p>
             <a:r>
               <a:rPr lang="en-US" dirty="0" smtClean="0"/>
-              <a:t>Azure Websites</a:t>
+              <a:t>Azure </a:t>
+            </a:r>
+            <a:r>
+              <a:rPr lang="en-US" dirty="0" smtClean="0"/>
+              <a:t>Web Apps</a:t>
             </a:r>
             <a:endParaRPr lang="en-US" dirty="0"/>
           </a:p>
@@ -5024,11 +5023,7 @@
             <a:pPr marL="914400" indent="-914400"/>
             <a:r>
               <a:rPr lang="en-US" dirty="0" smtClean="0"/>
-              <a:t>06 | Deploying to Azure with </a:t>
-            </a:r>
-            <a:r>
-              <a:rPr lang="en-US" dirty="0" smtClean="0"/>
-              <a:t>the Command Line</a:t>
+              <a:t>06 | Deploying to Azure with the Command Line</a:t>
             </a:r>
             <a:endParaRPr lang="en-US" dirty="0"/>
           </a:p>
@@ -5130,11 +5125,7 @@
           <a:p>
             <a:r>
               <a:rPr lang="en-US" dirty="0" smtClean="0"/>
-              <a:t>Deploying to Azure with </a:t>
-            </a:r>
-            <a:r>
-              <a:rPr lang="en-US" dirty="0" smtClean="0"/>
-              <a:t>the Command Line</a:t>
+              <a:t>Deploying to Azure with the Command Line</a:t>
             </a:r>
             <a:endParaRPr lang="en-US" dirty="0"/>
           </a:p>
@@ -5961,12 +5952,6 @@
 </file>
 
 <file path=customXml/item1.xml><?xml version="1.0" encoding="utf-8"?>
-<p:properties xmlns:p="http://schemas.microsoft.com/office/2006/metadata/properties" xmlns:xsi="http://www.w3.org/2001/XMLSchema-instance" xmlns:pc="http://schemas.microsoft.com/office/infopath/2007/PartnerControls">
-  <documentManagement/>
-</p:properties>
-</file>
-
-<file path=customXml/item2.xml><?xml version="1.0" encoding="utf-8"?>
 <ct:contentTypeSchema xmlns:ct="http://schemas.microsoft.com/office/2006/metadata/contentType" xmlns:ma="http://schemas.microsoft.com/office/2006/metadata/properties/metaAttributes" ct:_="" ma:_="" ma:contentTypeName="Document" ma:contentTypeID="0x010100391E57C78B9F604FB8BAD296D1460E2A" ma:contentTypeVersion="1" ma:contentTypeDescription="Create a new document." ma:contentTypeScope="" ma:versionID="fb382fe2362acd2155f454904f478e4d">
   <xsd:schema xmlns:xsd="http://www.w3.org/2001/XMLSchema" xmlns:xs="http://www.w3.org/2001/XMLSchema" xmlns:p="http://schemas.microsoft.com/office/2006/metadata/properties" xmlns:ns3="636b0322-90fb-440c-9cbc-22749e7231e9" targetNamespace="http://schemas.microsoft.com/office/2006/metadata/properties" ma:root="true" ma:fieldsID="b9887c63ce4710c1aeb75a5f03aecb69" ns3:_="">
     <xsd:import namespace="636b0322-90fb-440c-9cbc-22749e7231e9"/>
@@ -6106,6 +6091,12 @@
 </ct:contentTypeSchema>
 </file>
 
+<file path=customXml/item2.xml><?xml version="1.0" encoding="utf-8"?>
+<p:properties xmlns:p="http://schemas.microsoft.com/office/2006/metadata/properties" xmlns:xsi="http://www.w3.org/2001/XMLSchema-instance" xmlns:pc="http://schemas.microsoft.com/office/infopath/2007/PartnerControls">
+  <documentManagement/>
+</p:properties>
+</file>
+
 <file path=customXml/item3.xml><?xml version="1.0" encoding="utf-8"?>
 <?mso-contentType ?>
 <FormTemplates xmlns="http://schemas.microsoft.com/sharepoint/v3/contenttype/forms">
@@ -6116,22 +6107,6 @@
 </file>
 
 <file path=customXml/itemProps1.xml><?xml version="1.0" encoding="utf-8"?>
-<ds:datastoreItem xmlns:ds="http://schemas.openxmlformats.org/officeDocument/2006/customXml" ds:itemID="{7025FDD9-4C58-4084-9F89-0E6ADD6FFF55}">
-  <ds:schemaRefs>
-    <ds:schemaRef ds:uri="http://purl.org/dc/elements/1.1/"/>
-    <ds:schemaRef ds:uri="http://schemas.microsoft.com/office/2006/metadata/properties"/>
-    <ds:schemaRef ds:uri="636b0322-90fb-440c-9cbc-22749e7231e9"/>
-    <ds:schemaRef ds:uri="http://purl.org/dc/terms/"/>
-    <ds:schemaRef ds:uri="http://schemas.openxmlformats.org/package/2006/metadata/core-properties"/>
-    <ds:schemaRef ds:uri="http://schemas.microsoft.com/office/2006/documentManagement/types"/>
-    <ds:schemaRef ds:uri="http://schemas.microsoft.com/office/infopath/2007/PartnerControls"/>
-    <ds:schemaRef ds:uri="http://www.w3.org/XML/1998/namespace"/>
-    <ds:schemaRef ds:uri="http://purl.org/dc/dcmitype/"/>
-  </ds:schemaRefs>
-</ds:datastoreItem>
-</file>
-
-<file path=customXml/itemProps2.xml><?xml version="1.0" encoding="utf-8"?>
 <ds:datastoreItem xmlns:ds="http://schemas.openxmlformats.org/officeDocument/2006/customXml" ds:itemID="{7B70CE0C-0988-423A-BF66-B40F6A1061FF}">
   <ds:schemaRefs>
     <ds:schemaRef ds:uri="http://schemas.microsoft.com/office/2006/metadata/contentType"/>
@@ -6149,6 +6124,22 @@
 </ds:datastoreItem>
 </file>
 
+<file path=customXml/itemProps2.xml><?xml version="1.0" encoding="utf-8"?>
+<ds:datastoreItem xmlns:ds="http://schemas.openxmlformats.org/officeDocument/2006/customXml" ds:itemID="{7025FDD9-4C58-4084-9F89-0E6ADD6FFF55}">
+  <ds:schemaRefs>
+    <ds:schemaRef ds:uri="http://purl.org/dc/elements/1.1/"/>
+    <ds:schemaRef ds:uri="http://schemas.microsoft.com/office/2006/metadata/properties"/>
+    <ds:schemaRef ds:uri="636b0322-90fb-440c-9cbc-22749e7231e9"/>
+    <ds:schemaRef ds:uri="http://purl.org/dc/terms/"/>
+    <ds:schemaRef ds:uri="http://schemas.openxmlformats.org/package/2006/metadata/core-properties"/>
+    <ds:schemaRef ds:uri="http://schemas.microsoft.com/office/2006/documentManagement/types"/>
+    <ds:schemaRef ds:uri="http://schemas.microsoft.com/office/infopath/2007/PartnerControls"/>
+    <ds:schemaRef ds:uri="http://www.w3.org/XML/1998/namespace"/>
+    <ds:schemaRef ds:uri="http://purl.org/dc/dcmitype/"/>
+  </ds:schemaRefs>
+</ds:datastoreItem>
+</file>
+
 <file path=customXml/itemProps3.xml><?xml version="1.0" encoding="utf-8"?>
 <ds:datastoreItem xmlns:ds="http://schemas.openxmlformats.org/officeDocument/2006/customXml" ds:itemID="{B0CA13EC-1D3C-4D6F-8D1C-E8A452CFC79A}">
   <ds:schemaRefs>

</xml_diff>